<commit_message>
Added link to slides
</commit_message>
<xml_diff>
--- a/LaJollaLibrary/Slides/Creating a Game with FlowLab.io.pptx
+++ b/LaJollaLibrary/Slides/Creating a Game with FlowLab.io.pptx
@@ -271,6 +271,38 @@
               <a:t>Click to edit Master subtitle style</a:t>
             </a:r>
             <a:endParaRPr lang="en-US"/>
+          </a:p>
+        </p:txBody>
+      </p:sp>
+      <p:sp>
+        <p:nvSpPr>
+          <p:cNvPr id="4" name="TextBox 3"/>
+          <p:cNvSpPr txBox="1"/>
+          <p:nvPr userDrawn="1"/>
+        </p:nvSpPr>
+        <p:spPr>
+          <a:xfrm>
+            <a:off x="4718860" y="6400804"/>
+            <a:ext cx="2754280" cy="369332"/>
+          </a:xfrm>
+          <a:prstGeom prst="rect">
+            <a:avLst/>
+          </a:prstGeom>
+          <a:noFill/>
+        </p:spPr>
+        <p:txBody>
+          <a:bodyPr wrap="none" rtlCol="0">
+            <a:spAutoFit/>
+          </a:bodyPr>
+          <a:lstStyle/>
+          <a:p>
+            <a:r>
+              <a:rPr lang="en-US" dirty="0" smtClean="0">
+                <a:hlinkClick r:id="rId2"/>
+              </a:rPr>
+              <a:t>http://aka.ms/flowlabslides</a:t>
+            </a:r>
+            <a:endParaRPr lang="en-US" dirty="0"/>
           </a:p>
         </p:txBody>
       </p:sp>

</xml_diff>

<commit_message>
Removed messaging from logic
</commit_message>
<xml_diff>
--- a/LaJollaLibrary/Slides/Creating a Game with FlowLab.io.pptx
+++ b/LaJollaLibrary/Slides/Creating a Game with FlowLab.io.pptx
@@ -24,33 +24,37 @@
     <p:sldId id="272" r:id="rId18"/>
     <p:sldId id="273" r:id="rId19"/>
     <p:sldId id="274" r:id="rId20"/>
-    <p:sldId id="275" r:id="rId21"/>
-    <p:sldId id="276" r:id="rId22"/>
-    <p:sldId id="277" r:id="rId23"/>
-    <p:sldId id="278" r:id="rId24"/>
-    <p:sldId id="279" r:id="rId25"/>
+    <p:sldId id="289" r:id="rId21"/>
+    <p:sldId id="277" r:id="rId22"/>
+    <p:sldId id="278" r:id="rId23"/>
+    <p:sldId id="279" r:id="rId24"/>
+    <p:sldId id="290" r:id="rId25"/>
     <p:sldId id="280" r:id="rId26"/>
     <p:sldId id="281" r:id="rId27"/>
-    <p:sldId id="282" r:id="rId28"/>
-    <p:sldId id="283" r:id="rId29"/>
-    <p:sldId id="284" r:id="rId30"/>
-    <p:sldId id="285" r:id="rId31"/>
-    <p:sldId id="286" r:id="rId32"/>
-    <p:sldId id="287" r:id="rId33"/>
-    <p:sldId id="288" r:id="rId34"/>
+    <p:sldId id="291" r:id="rId28"/>
+    <p:sldId id="292" r:id="rId29"/>
+    <p:sldId id="293" r:id="rId30"/>
+    <p:sldId id="294" r:id="rId31"/>
+    <p:sldId id="296" r:id="rId32"/>
+    <p:sldId id="295" r:id="rId33"/>
+    <p:sldId id="284" r:id="rId34"/>
+    <p:sldId id="285" r:id="rId35"/>
+    <p:sldId id="286" r:id="rId36"/>
+    <p:sldId id="287" r:id="rId37"/>
+    <p:sldId id="288" r:id="rId38"/>
   </p:sldIdLst>
   <p:sldSz cx="12192000" cy="6858000"/>
   <p:notesSz cx="6858000" cy="9144000"/>
   <p:embeddedFontLst>
     <p:embeddedFont>
       <p:font typeface="Segoe UI Light" panose="020B0502040204020203" pitchFamily="34" charset="0"/>
-      <p:regular r:id="rId35"/>
-      <p:italic r:id="rId36"/>
+      <p:regular r:id="rId39"/>
+      <p:italic r:id="rId40"/>
     </p:embeddedFont>
     <p:embeddedFont>
       <p:font typeface="Segoe UI Black" panose="020B0A02040204020203" pitchFamily="34" charset="0"/>
-      <p:bold r:id="rId37"/>
-      <p:boldItalic r:id="rId38"/>
+      <p:bold r:id="rId41"/>
+      <p:boldItalic r:id="rId42"/>
     </p:embeddedFont>
   </p:embeddedFontLst>
   <p:defaultTextStyle>
@@ -20795,7 +20799,7 @@
           <a:p>
             <a:r>
               <a:rPr lang="en-US" dirty="0" smtClean="0"/>
-              <a:t>Send coin message to the player</a:t>
+              <a:t>Add coin to player score</a:t>
             </a:r>
             <a:endParaRPr lang="en-US" dirty="0"/>
           </a:p>
@@ -20803,11 +20807,13 @@
       </p:sp>
       <p:pic>
         <p:nvPicPr>
-          <p:cNvPr id="12290" name="Picture 2" descr="C:\Users\brets\AppData\Local\Temp\SNAGHTML5697d6c.PNG"/>
+          <p:cNvPr id="1028" name="Picture 4" descr="C:\Users\brets\AppData\Local\Temp\SNAGHTML6bf05db.PNG"/>
           <p:cNvPicPr>
-            <a:picLocks noChangeAspect="1" noChangeArrowheads="1"/>
+            <a:picLocks noGrp="1" noChangeAspect="1" noChangeArrowheads="1"/>
           </p:cNvPicPr>
-          <p:nvPr/>
+          <p:nvPr>
+            <p:ph idx="1"/>
+          </p:nvPr>
         </p:nvPicPr>
         <p:blipFill>
           <a:blip r:embed="rId2">
@@ -20824,8 +20830,8 @@
         </p:blipFill>
         <p:spPr bwMode="auto">
           <a:xfrm>
-            <a:off x="3280410" y="1675448"/>
-            <a:ext cx="5600700" cy="4486276"/>
+            <a:off x="1260519" y="1794932"/>
+            <a:ext cx="9615931" cy="4438121"/>
           </a:xfrm>
           <a:prstGeom prst="rect">
             <a:avLst/>
@@ -20845,7 +20851,7 @@
     </p:spTree>
     <p:extLst>
       <p:ext uri="{BB962C8B-B14F-4D97-AF65-F5344CB8AC3E}">
-        <p14:creationId xmlns:p14="http://schemas.microsoft.com/office/powerpoint/2010/main" val="1841907282"/>
+        <p14:creationId xmlns:p14="http://schemas.microsoft.com/office/powerpoint/2010/main" val="3516923369"/>
       </p:ext>
     </p:extLst>
   </p:cSld>
@@ -20889,103 +20895,15 @@
           <a:p>
             <a:r>
               <a:rPr lang="en-US" dirty="0" smtClean="0"/>
-              <a:t>Player receives coin message</a:t>
+              <a:t>Position </a:t>
             </a:r>
-            <a:endParaRPr lang="en-US" dirty="0"/>
-          </a:p>
-        </p:txBody>
-      </p:sp>
-      <p:pic>
-        <p:nvPicPr>
-          <p:cNvPr id="13314" name="Picture 2" descr="C:\Users\brets\AppData\Local\Temp\SNAGHTML56bfac1.PNG"/>
-          <p:cNvPicPr>
-            <a:picLocks noGrp="1" noChangeAspect="1" noChangeArrowheads="1"/>
-          </p:cNvPicPr>
-          <p:nvPr>
-            <p:ph idx="1"/>
-          </p:nvPr>
-        </p:nvPicPr>
-        <p:blipFill>
-          <a:blip r:embed="rId2">
-            <a:extLst>
-              <a:ext uri="{28A0092B-C50C-407E-A947-70E740481C1C}">
-                <a14:useLocalDpi xmlns:a14="http://schemas.microsoft.com/office/drawing/2010/main" val="0"/>
-              </a:ext>
-            </a:extLst>
-          </a:blip>
-          <a:srcRect/>
-          <a:stretch>
-            <a:fillRect/>
-          </a:stretch>
-        </p:blipFill>
-        <p:spPr bwMode="auto">
-          <a:xfrm>
-            <a:off x="887526" y="1880558"/>
-            <a:ext cx="10416948" cy="4241472"/>
-          </a:xfrm>
-          <a:prstGeom prst="rect">
-            <a:avLst/>
-          </a:prstGeom>
-          <a:noFill/>
-          <a:extLst>
-            <a:ext uri="{909E8E84-426E-40DD-AFC4-6F175D3DCCD1}">
-              <a14:hiddenFill xmlns:a14="http://schemas.microsoft.com/office/drawing/2010/main">
-                <a:solidFill>
-                  <a:srgbClr val="FFFFFF"/>
-                </a:solidFill>
-              </a14:hiddenFill>
-            </a:ext>
-          </a:extLst>
-        </p:spPr>
-      </p:pic>
-    </p:spTree>
-    <p:extLst>
-      <p:ext uri="{BB962C8B-B14F-4D97-AF65-F5344CB8AC3E}">
-        <p14:creationId xmlns:p14="http://schemas.microsoft.com/office/powerpoint/2010/main" val="1955631202"/>
-      </p:ext>
-    </p:extLst>
-  </p:cSld>
-  <p:clrMapOvr>
-    <a:masterClrMapping/>
-  </p:clrMapOvr>
-</p:sld>
-</file>
-
-<file path=ppt/slides/slide22.xml><?xml version="1.0" encoding="utf-8"?>
-<p:sld xmlns:a="http://schemas.openxmlformats.org/drawingml/2006/main" xmlns:r="http://schemas.openxmlformats.org/officeDocument/2006/relationships" xmlns:p="http://schemas.openxmlformats.org/presentationml/2006/main">
-  <p:cSld>
-    <p:spTree>
-      <p:nvGrpSpPr>
-        <p:cNvPr id="1" name=""/>
-        <p:cNvGrpSpPr/>
-        <p:nvPr/>
-      </p:nvGrpSpPr>
-      <p:grpSpPr>
-        <a:xfrm>
-          <a:off x="0" y="0"/>
-          <a:ext cx="0" cy="0"/>
-          <a:chOff x="0" y="0"/>
-          <a:chExt cx="0" cy="0"/>
-        </a:xfrm>
-      </p:grpSpPr>
-      <p:sp>
-        <p:nvSpPr>
-          <p:cNvPr id="2" name="Title 1"/>
-          <p:cNvSpPr>
-            <a:spLocks noGrp="1"/>
-          </p:cNvSpPr>
-          <p:nvPr>
-            <p:ph type="title"/>
-          </p:nvPr>
-        </p:nvSpPr>
-        <p:spPr/>
-        <p:txBody>
-          <a:bodyPr/>
-          <a:lstStyle/>
-          <a:p>
             <a:r>
               <a:rPr lang="en-US" dirty="0" smtClean="0"/>
-              <a:t>Position sore label</a:t>
+              <a:t>score </a:t>
+            </a:r>
+            <a:r>
+              <a:rPr lang="en-US" dirty="0" smtClean="0"/>
+              <a:t>label</a:t>
             </a:r>
             <a:endParaRPr lang="en-US" dirty="0"/>
           </a:p>
@@ -21034,6 +20952,98 @@
           </a:extLst>
         </p:spPr>
       </p:pic>
+      <p:sp>
+        <p:nvSpPr>
+          <p:cNvPr id="3" name="Rounded Rectangle 2"/>
+          <p:cNvSpPr/>
+          <p:nvPr/>
+        </p:nvSpPr>
+        <p:spPr>
+          <a:xfrm>
+            <a:off x="6917267" y="5283199"/>
+            <a:ext cx="1016000" cy="321734"/>
+          </a:xfrm>
+          <a:prstGeom prst="roundRect">
+            <a:avLst/>
+          </a:prstGeom>
+          <a:noFill/>
+          <a:ln w="38100">
+            <a:solidFill>
+              <a:schemeClr val="accent2"/>
+            </a:solidFill>
+          </a:ln>
+        </p:spPr>
+        <p:style>
+          <a:lnRef idx="2">
+            <a:schemeClr val="accent1">
+              <a:shade val="50000"/>
+            </a:schemeClr>
+          </a:lnRef>
+          <a:fillRef idx="1">
+            <a:schemeClr val="accent1"/>
+          </a:fillRef>
+          <a:effectRef idx="0">
+            <a:schemeClr val="accent1"/>
+          </a:effectRef>
+          <a:fontRef idx="minor">
+            <a:schemeClr val="lt1"/>
+          </a:fontRef>
+        </p:style>
+        <p:txBody>
+          <a:bodyPr rtlCol="0" anchor="ctr"/>
+          <a:lstStyle/>
+          <a:p>
+            <a:pPr algn="ctr"/>
+            <a:endParaRPr lang="en-US"/>
+          </a:p>
+        </p:txBody>
+      </p:sp>
+      <p:sp>
+        <p:nvSpPr>
+          <p:cNvPr id="5" name="Rounded Rectangle 4"/>
+          <p:cNvSpPr/>
+          <p:nvPr/>
+        </p:nvSpPr>
+        <p:spPr>
+          <a:xfrm>
+            <a:off x="7196667" y="2370666"/>
+            <a:ext cx="524933" cy="287867"/>
+          </a:xfrm>
+          <a:prstGeom prst="roundRect">
+            <a:avLst/>
+          </a:prstGeom>
+          <a:noFill/>
+          <a:ln w="38100">
+            <a:solidFill>
+              <a:schemeClr val="accent2"/>
+            </a:solidFill>
+          </a:ln>
+        </p:spPr>
+        <p:style>
+          <a:lnRef idx="2">
+            <a:schemeClr val="accent1">
+              <a:shade val="50000"/>
+            </a:schemeClr>
+          </a:lnRef>
+          <a:fillRef idx="1">
+            <a:schemeClr val="accent1"/>
+          </a:fillRef>
+          <a:effectRef idx="0">
+            <a:schemeClr val="accent1"/>
+          </a:effectRef>
+          <a:fontRef idx="minor">
+            <a:schemeClr val="lt1"/>
+          </a:fontRef>
+        </p:style>
+        <p:txBody>
+          <a:bodyPr rtlCol="0" anchor="ctr"/>
+          <a:lstStyle/>
+          <a:p>
+            <a:pPr algn="ctr"/>
+            <a:endParaRPr lang="en-US"/>
+          </a:p>
+        </p:txBody>
+      </p:sp>
     </p:spTree>
     <p:extLst>
       <p:ext uri="{BB962C8B-B14F-4D97-AF65-F5344CB8AC3E}">
@@ -21047,7 +21057,7 @@
 </p:sld>
 </file>
 
-<file path=ppt/slides/slide23.xml><?xml version="1.0" encoding="utf-8"?>
+<file path=ppt/slides/slide22.xml><?xml version="1.0" encoding="utf-8"?>
 <p:sld xmlns:a="http://schemas.openxmlformats.org/drawingml/2006/main" xmlns:r="http://schemas.openxmlformats.org/officeDocument/2006/relationships" xmlns:p="http://schemas.openxmlformats.org/presentationml/2006/main">
   <p:cSld>
     <p:spTree>
@@ -21133,7 +21143,7 @@
 </p:sld>
 </file>
 
-<file path=ppt/slides/slide24.xml><?xml version="1.0" encoding="utf-8"?>
+<file path=ppt/slides/slide23.xml><?xml version="1.0" encoding="utf-8"?>
 <p:sld xmlns:a="http://schemas.openxmlformats.org/drawingml/2006/main" xmlns:r="http://schemas.openxmlformats.org/officeDocument/2006/relationships" xmlns:p="http://schemas.openxmlformats.org/presentationml/2006/main">
   <p:cSld>
     <p:spTree>
@@ -21175,7 +21185,7 @@
       </p:sp>
       <p:pic>
         <p:nvPicPr>
-          <p:cNvPr id="15362" name="Picture 2" descr="C:\Users\brets\AppData\Local\Temp\SNAGHTML570d4c2.PNG"/>
+          <p:cNvPr id="2050" name="Picture 2" descr="C:\Users\brets\AppData\Local\Temp\SNAGHTML6c41b11.PNG"/>
           <p:cNvPicPr>
             <a:picLocks noGrp="1" noChangeAspect="1" noChangeArrowheads="1"/>
           </p:cNvPicPr>
@@ -21198,8 +21208,8 @@
         </p:blipFill>
         <p:spPr bwMode="auto">
           <a:xfrm>
-            <a:off x="1499743" y="2018582"/>
-            <a:ext cx="8778446" cy="3585862"/>
+            <a:off x="838200" y="1920532"/>
+            <a:ext cx="10515600" cy="4161523"/>
           </a:xfrm>
           <a:prstGeom prst="rect">
             <a:avLst/>
@@ -21216,76 +21226,6 @@
           </a:extLst>
         </p:spPr>
       </p:pic>
-      <p:pic>
-        <p:nvPicPr>
-          <p:cNvPr id="4" name="Picture 3"/>
-          <p:cNvPicPr>
-            <a:picLocks noChangeAspect="1"/>
-          </p:cNvPicPr>
-          <p:nvPr/>
-        </p:nvPicPr>
-        <p:blipFill>
-          <a:blip r:embed="rId3"/>
-          <a:stretch>
-            <a:fillRect/>
-          </a:stretch>
-        </p:blipFill>
-        <p:spPr>
-          <a:xfrm>
-            <a:off x="7488157" y="1030776"/>
-            <a:ext cx="2432219" cy="2641323"/>
-          </a:xfrm>
-          <a:prstGeom prst="rect">
-            <a:avLst/>
-          </a:prstGeom>
-        </p:spPr>
-      </p:pic>
-      <p:sp>
-        <p:nvSpPr>
-          <p:cNvPr id="6" name="Isosceles Triangle 5"/>
-          <p:cNvSpPr/>
-          <p:nvPr/>
-        </p:nvSpPr>
-        <p:spPr>
-          <a:xfrm rot="10800000">
-            <a:off x="8488392" y="3672099"/>
-            <a:ext cx="429797" cy="370514"/>
-          </a:xfrm>
-          <a:prstGeom prst="triangle">
-            <a:avLst/>
-          </a:prstGeom>
-          <a:solidFill>
-            <a:srgbClr val="202123"/>
-          </a:solidFill>
-          <a:ln>
-            <a:noFill/>
-          </a:ln>
-        </p:spPr>
-        <p:style>
-          <a:lnRef idx="2">
-            <a:schemeClr val="accent1">
-              <a:shade val="50000"/>
-            </a:schemeClr>
-          </a:lnRef>
-          <a:fillRef idx="1">
-            <a:schemeClr val="accent1"/>
-          </a:fillRef>
-          <a:effectRef idx="0">
-            <a:schemeClr val="accent1"/>
-          </a:effectRef>
-          <a:fontRef idx="minor">
-            <a:schemeClr val="lt1"/>
-          </a:fontRef>
-        </p:style>
-        <p:txBody>
-          <a:bodyPr rtlCol="0" anchor="ctr"/>
-          <a:lstStyle/>
-          <a:p>
-            <a:pPr algn="ctr"/>
-            <a:endParaRPr lang="en-US"/>
-          </a:p>
-        </p:txBody>
-      </p:sp>
     </p:spTree>
     <p:extLst>
       <p:ext uri="{BB962C8B-B14F-4D97-AF65-F5344CB8AC3E}">
@@ -21303,6 +21243,106 @@
       </p:par>
     </p:tnLst>
   </p:timing>
+</p:sld>
+</file>
+
+<file path=ppt/slides/slide24.xml><?xml version="1.0" encoding="utf-8"?>
+<p:sld xmlns:a="http://schemas.openxmlformats.org/drawingml/2006/main" xmlns:r="http://schemas.openxmlformats.org/officeDocument/2006/relationships" xmlns:p="http://schemas.openxmlformats.org/presentationml/2006/main">
+  <p:cSld>
+    <p:spTree>
+      <p:nvGrpSpPr>
+        <p:cNvPr id="1" name=""/>
+        <p:cNvGrpSpPr/>
+        <p:nvPr/>
+      </p:nvGrpSpPr>
+      <p:grpSpPr>
+        <a:xfrm>
+          <a:off x="0" y="0"/>
+          <a:ext cx="0" cy="0"/>
+          <a:chOff x="0" y="0"/>
+          <a:chExt cx="0" cy="0"/>
+        </a:xfrm>
+      </p:grpSpPr>
+      <p:sp>
+        <p:nvSpPr>
+          <p:cNvPr id="2" name="Title 1"/>
+          <p:cNvSpPr>
+            <a:spLocks noGrp="1"/>
+          </p:cNvSpPr>
+          <p:nvPr>
+            <p:ph type="title"/>
+          </p:nvPr>
+        </p:nvSpPr>
+        <p:spPr/>
+        <p:txBody>
+          <a:bodyPr/>
+          <a:lstStyle/>
+          <a:p>
+            <a:r>
+              <a:rPr lang="en-US" dirty="0" smtClean="0"/>
+              <a:t>Reset the Score at </a:t>
+            </a:r>
+            <a:r>
+              <a:rPr lang="en-US" dirty="0" err="1" smtClean="0"/>
+              <a:t>STart</a:t>
+            </a:r>
+            <a:endParaRPr lang="en-US" dirty="0"/>
+          </a:p>
+        </p:txBody>
+      </p:sp>
+      <p:pic>
+        <p:nvPicPr>
+          <p:cNvPr id="3074" name="Picture 2" descr="C:\Users\brets\AppData\Local\Temp\SNAGHTML6c62930.PNG"/>
+          <p:cNvPicPr>
+            <a:picLocks noGrp="1" noChangeAspect="1" noChangeArrowheads="1"/>
+          </p:cNvPicPr>
+          <p:nvPr>
+            <p:ph idx="1"/>
+          </p:nvPr>
+        </p:nvPicPr>
+        <p:blipFill>
+          <a:blip r:embed="rId2">
+            <a:extLst>
+              <a:ext uri="{28A0092B-C50C-407E-A947-70E740481C1C}">
+                <a14:useLocalDpi xmlns:a14="http://schemas.microsoft.com/office/drawing/2010/main" val="0"/>
+              </a:ext>
+            </a:extLst>
+          </a:blip>
+          <a:srcRect/>
+          <a:stretch>
+            <a:fillRect/>
+          </a:stretch>
+        </p:blipFill>
+        <p:spPr bwMode="auto">
+          <a:xfrm>
+            <a:off x="838200" y="2478641"/>
+            <a:ext cx="10515600" cy="3045306"/>
+          </a:xfrm>
+          <a:prstGeom prst="rect">
+            <a:avLst/>
+          </a:prstGeom>
+          <a:noFill/>
+          <a:extLst>
+            <a:ext uri="{909E8E84-426E-40DD-AFC4-6F175D3DCCD1}">
+              <a14:hiddenFill xmlns:a14="http://schemas.microsoft.com/office/drawing/2010/main">
+                <a:solidFill>
+                  <a:srgbClr val="FFFFFF"/>
+                </a:solidFill>
+              </a14:hiddenFill>
+            </a:ext>
+          </a:extLst>
+        </p:spPr>
+      </p:pic>
+    </p:spTree>
+    <p:extLst>
+      <p:ext uri="{BB962C8B-B14F-4D97-AF65-F5344CB8AC3E}">
+        <p14:creationId xmlns:p14="http://schemas.microsoft.com/office/powerpoint/2010/main" val="3746602256"/>
+      </p:ext>
+    </p:extLst>
+  </p:cSld>
+  <p:clrMapOvr>
+    <a:masterClrMapping/>
+  </p:clrMapOvr>
 </p:sld>
 </file>
 
@@ -21403,7 +21443,7 @@
 </file>
 
 <file path=ppt/slides/slide26.xml><?xml version="1.0" encoding="utf-8"?>
-<p:sld xmlns:a="http://schemas.openxmlformats.org/drawingml/2006/main" xmlns:r="http://schemas.openxmlformats.org/officeDocument/2006/relationships" xmlns:p="http://schemas.openxmlformats.org/presentationml/2006/main">
+<p:sld xmlns:a="http://schemas.openxmlformats.org/drawingml/2006/main" xmlns:r="http://schemas.openxmlformats.org/officeDocument/2006/relationships" xmlns:p="http://schemas.openxmlformats.org/presentationml/2006/main" show="0">
   <p:cSld>
     <p:spTree>
       <p:nvGrpSpPr>
@@ -21633,6 +21673,14 @@
   <p:clrMapOvr>
     <a:masterClrMapping/>
   </p:clrMapOvr>
+  <mc:AlternateContent xmlns:mc="http://schemas.openxmlformats.org/markup-compatibility/2006">
+    <mc:Choice xmlns:p14="http://schemas.microsoft.com/office/powerpoint/2010/main" Requires="p14">
+      <p:transition spd="slow" p14:dur="2000"/>
+    </mc:Choice>
+    <mc:Fallback>
+      <p:transition spd="slow"/>
+    </mc:Fallback>
+  </mc:AlternateContent>
 </p:sld>
 </file>
 
@@ -21653,9 +21701,32 @@
           <a:chExt cx="0" cy="0"/>
         </a:xfrm>
       </p:grpSpPr>
+      <p:sp>
+        <p:nvSpPr>
+          <p:cNvPr id="2" name="Title 1"/>
+          <p:cNvSpPr>
+            <a:spLocks noGrp="1"/>
+          </p:cNvSpPr>
+          <p:nvPr>
+            <p:ph type="title"/>
+          </p:nvPr>
+        </p:nvSpPr>
+        <p:spPr/>
+        <p:txBody>
+          <a:bodyPr/>
+          <a:lstStyle/>
+          <a:p>
+            <a:r>
+              <a:rPr lang="en-US" dirty="0" smtClean="0"/>
+              <a:t>Play enemy collision sound</a:t>
+            </a:r>
+            <a:endParaRPr lang="en-US" dirty="0"/>
+          </a:p>
+        </p:txBody>
+      </p:sp>
       <p:pic>
         <p:nvPicPr>
-          <p:cNvPr id="10" name="Picture 4" descr="C:\Users\brets\AppData\Local\Temp\SNAGHTML58100f4.PNG"/>
+          <p:cNvPr id="4102" name="Picture 6" descr="C:\Users\brets\AppData\Local\Temp\SNAGHTML6cbc23c.PNG"/>
           <p:cNvPicPr>
             <a:picLocks noGrp="1" noChangeAspect="1" noChangeArrowheads="1"/>
           </p:cNvPicPr>
@@ -21678,8 +21749,8 @@
         </p:blipFill>
         <p:spPr bwMode="auto">
           <a:xfrm>
-            <a:off x="822960" y="1534057"/>
-            <a:ext cx="8080076" cy="4934474"/>
+            <a:off x="822960" y="1675448"/>
+            <a:ext cx="7697811" cy="4056043"/>
           </a:xfrm>
           <a:prstGeom prst="rect">
             <a:avLst/>
@@ -21698,147 +21769,38 @@
       </p:pic>
       <p:sp>
         <p:nvSpPr>
-          <p:cNvPr id="2" name="Title 1"/>
-          <p:cNvSpPr>
-            <a:spLocks noGrp="1"/>
-          </p:cNvSpPr>
-          <p:nvPr>
-            <p:ph type="title"/>
-          </p:nvPr>
-        </p:nvSpPr>
-        <p:spPr/>
-        <p:txBody>
-          <a:bodyPr/>
-          <a:lstStyle/>
-          <a:p>
-            <a:r>
-              <a:rPr lang="en-US" dirty="0" smtClean="0"/>
-              <a:t>Add game over logic to player</a:t>
-            </a:r>
-            <a:endParaRPr lang="en-US" dirty="0"/>
-          </a:p>
-        </p:txBody>
-      </p:sp>
-      <p:sp>
-        <p:nvSpPr>
-          <p:cNvPr id="5" name="Rounded Rectangle 4"/>
-          <p:cNvSpPr/>
+          <p:cNvPr id="5" name="TextBox 4"/>
+          <p:cNvSpPr txBox="1"/>
           <p:nvPr/>
         </p:nvSpPr>
         <p:spPr>
           <a:xfrm>
-            <a:off x="822960" y="3709358"/>
-            <a:ext cx="8545327" cy="2838091"/>
-          </a:xfrm>
-          <a:prstGeom prst="roundRect">
-            <a:avLst/>
-          </a:prstGeom>
-          <a:noFill/>
-          <a:ln w="76200">
-            <a:solidFill>
-              <a:schemeClr val="accent2"/>
-            </a:solidFill>
-          </a:ln>
-        </p:spPr>
-        <p:style>
-          <a:lnRef idx="2">
-            <a:schemeClr val="accent1">
-              <a:shade val="50000"/>
-            </a:schemeClr>
-          </a:lnRef>
-          <a:fillRef idx="1">
-            <a:schemeClr val="accent1"/>
-          </a:fillRef>
-          <a:effectRef idx="0">
-            <a:schemeClr val="accent1"/>
-          </a:effectRef>
-          <a:fontRef idx="minor">
-            <a:schemeClr val="lt1"/>
-          </a:fontRef>
-        </p:style>
-        <p:txBody>
-          <a:bodyPr rtlCol="0" anchor="ctr"/>
-          <a:lstStyle/>
-          <a:p>
-            <a:pPr algn="ctr"/>
-            <a:endParaRPr lang="en-US"/>
-          </a:p>
-        </p:txBody>
-      </p:sp>
-      <p:pic>
-        <p:nvPicPr>
-          <p:cNvPr id="4" name="Picture 3"/>
-          <p:cNvPicPr>
-            <a:picLocks noChangeAspect="1"/>
-          </p:cNvPicPr>
-          <p:nvPr/>
-        </p:nvPicPr>
-        <p:blipFill>
-          <a:blip r:embed="rId3"/>
-          <a:stretch>
-            <a:fillRect/>
-          </a:stretch>
-        </p:blipFill>
-        <p:spPr>
-          <a:xfrm>
-            <a:off x="8312484" y="2922332"/>
-            <a:ext cx="3177902" cy="3435568"/>
+            <a:off x="8779933" y="1675448"/>
+            <a:ext cx="3318934" cy="3539430"/>
           </a:xfrm>
           <a:prstGeom prst="rect">
             <a:avLst/>
           </a:prstGeom>
+          <a:noFill/>
         </p:spPr>
-      </p:pic>
-      <p:sp>
-        <p:nvSpPr>
-          <p:cNvPr id="6" name="Isosceles Triangle 5"/>
-          <p:cNvSpPr/>
-          <p:nvPr/>
-        </p:nvSpPr>
-        <p:spPr>
-          <a:xfrm rot="16200000">
-            <a:off x="8025819" y="4669758"/>
-            <a:ext cx="429797" cy="370514"/>
-          </a:xfrm>
-          <a:prstGeom prst="triangle">
-            <a:avLst/>
-          </a:prstGeom>
-          <a:solidFill>
-            <a:srgbClr val="202123"/>
-          </a:solidFill>
-          <a:ln>
-            <a:noFill/>
-          </a:ln>
-        </p:spPr>
-        <p:style>
-          <a:lnRef idx="2">
-            <a:schemeClr val="accent1">
-              <a:shade val="50000"/>
-            </a:schemeClr>
-          </a:lnRef>
-          <a:fillRef idx="1">
-            <a:schemeClr val="accent1"/>
-          </a:fillRef>
-          <a:effectRef idx="0">
-            <a:schemeClr val="accent1"/>
-          </a:effectRef>
-          <a:fontRef idx="minor">
-            <a:schemeClr val="lt1"/>
-          </a:fontRef>
-        </p:style>
         <p:txBody>
-          <a:bodyPr rtlCol="0" anchor="ctr"/>
+          <a:bodyPr wrap="square" rtlCol="0">
+            <a:spAutoFit/>
+          </a:bodyPr>
           <a:lstStyle/>
           <a:p>
-            <a:pPr algn="ctr"/>
-            <a:endParaRPr lang="en-US"/>
+            <a:r>
+              <a:rPr lang="en-US" sz="2800" dirty="0" smtClean="0"/>
+              <a:t>THIS COLLISION TRIGGER SHOULD ONLY FIRE IF THE ENEMY COLLIDES WITH THE PLAYER ON THE ENEMY’S SIDES OR BOTTOM, NOT THE TOP</a:t>
+            </a:r>
+            <a:endParaRPr lang="en-US" sz="2800" dirty="0"/>
           </a:p>
         </p:txBody>
       </p:sp>
     </p:spTree>
     <p:extLst>
       <p:ext uri="{BB962C8B-B14F-4D97-AF65-F5344CB8AC3E}">
-        <p14:creationId xmlns:p14="http://schemas.microsoft.com/office/powerpoint/2010/main" val="83856395"/>
+        <p14:creationId xmlns:p14="http://schemas.microsoft.com/office/powerpoint/2010/main" val="3545602214"/>
       </p:ext>
     </p:extLst>
   </p:cSld>
@@ -21882,7 +21844,7 @@
           <a:p>
             <a:r>
               <a:rPr lang="en-US" dirty="0" smtClean="0"/>
-              <a:t>Add kill enemy collision</a:t>
+              <a:t>DESTROY ENEMY ON TOP COLLISION</a:t>
             </a:r>
             <a:endParaRPr lang="en-US" dirty="0"/>
           </a:p>
@@ -21890,7 +21852,7 @@
       </p:sp>
       <p:pic>
         <p:nvPicPr>
-          <p:cNvPr id="19458" name="Picture 2" descr="C:\Users\brets\AppData\Local\Temp\SNAGHTML5837d6e.PNG"/>
+          <p:cNvPr id="5122" name="Picture 2" descr="C:\Users\brets\AppData\Local\Temp\SNAGHTML6cf161a.PNG"/>
           <p:cNvPicPr>
             <a:picLocks noGrp="1" noChangeAspect="1" noChangeArrowheads="1"/>
           </p:cNvPicPr>
@@ -21913,8 +21875,8 @@
         </p:blipFill>
         <p:spPr bwMode="auto">
           <a:xfrm>
-            <a:off x="1017709" y="2570673"/>
-            <a:ext cx="10156582" cy="2861242"/>
+            <a:off x="822960" y="1794933"/>
+            <a:ext cx="7862089" cy="3780027"/>
           </a:xfrm>
           <a:prstGeom prst="rect">
             <a:avLst/>
@@ -21931,10 +21893,44 @@
           </a:extLst>
         </p:spPr>
       </p:pic>
+      <p:sp>
+        <p:nvSpPr>
+          <p:cNvPr id="5" name="TextBox 4"/>
+          <p:cNvSpPr txBox="1"/>
+          <p:nvPr/>
+        </p:nvSpPr>
+        <p:spPr>
+          <a:xfrm>
+            <a:off x="8779933" y="1675448"/>
+            <a:ext cx="3318934" cy="3970318"/>
+          </a:xfrm>
+          <a:prstGeom prst="rect">
+            <a:avLst/>
+          </a:prstGeom>
+          <a:noFill/>
+        </p:spPr>
+        <p:txBody>
+          <a:bodyPr wrap="square" rtlCol="0">
+            <a:spAutoFit/>
+          </a:bodyPr>
+          <a:lstStyle/>
+          <a:p>
+            <a:r>
+              <a:rPr lang="en-US" sz="2800" dirty="0" smtClean="0"/>
+              <a:t>THIS COLLISION TRIGGER SHOULD ONLY FIRE IF THE ENEMY COLLIDES WITH THE PLAYER ON THE ENEMY’S </a:t>
+            </a:r>
+            <a:r>
+              <a:rPr lang="en-US" sz="2800" b="1" dirty="0" smtClean="0"/>
+              <a:t>TOP (when the player “LANDS ON” the enemy)</a:t>
+            </a:r>
+            <a:endParaRPr lang="en-US" sz="2800" b="1" dirty="0"/>
+          </a:p>
+        </p:txBody>
+      </p:sp>
     </p:spTree>
     <p:extLst>
       <p:ext uri="{BB962C8B-B14F-4D97-AF65-F5344CB8AC3E}">
-        <p14:creationId xmlns:p14="http://schemas.microsoft.com/office/powerpoint/2010/main" val="3657889018"/>
+        <p14:creationId xmlns:p14="http://schemas.microsoft.com/office/powerpoint/2010/main" val="1325268654"/>
       </p:ext>
     </p:extLst>
   </p:cSld>
@@ -21978,15 +21974,45 @@
           <a:p>
             <a:r>
               <a:rPr lang="en-US" dirty="0" smtClean="0"/>
-              <a:t>ADD ENEMY MOVEMENT</a:t>
+              <a:t>Hurt player on enemy collision</a:t>
             </a:r>
             <a:endParaRPr lang="en-US" dirty="0"/>
           </a:p>
         </p:txBody>
       </p:sp>
+      <p:sp>
+        <p:nvSpPr>
+          <p:cNvPr id="12" name="TextBox 11"/>
+          <p:cNvSpPr txBox="1"/>
+          <p:nvPr/>
+        </p:nvSpPr>
+        <p:spPr>
+          <a:xfrm>
+            <a:off x="8873066" y="1962768"/>
+            <a:ext cx="3318934" cy="2246769"/>
+          </a:xfrm>
+          <a:prstGeom prst="rect">
+            <a:avLst/>
+          </a:prstGeom>
+          <a:noFill/>
+        </p:spPr>
+        <p:txBody>
+          <a:bodyPr wrap="square" rtlCol="0">
+            <a:spAutoFit/>
+          </a:bodyPr>
+          <a:lstStyle/>
+          <a:p>
+            <a:r>
+              <a:rPr lang="en-US" sz="2800" dirty="0" smtClean="0"/>
+              <a:t>The player only gets hurt if it collides with the enemy on the player’s TOP or SIDES</a:t>
+            </a:r>
+            <a:endParaRPr lang="en-US" sz="2800" b="1" dirty="0"/>
+          </a:p>
+        </p:txBody>
+      </p:sp>
       <p:pic>
         <p:nvPicPr>
-          <p:cNvPr id="20482" name="Picture 2" descr="C:\Users\brets\AppData\Local\Temp\SNAGHTML58ca9f1.PNG"/>
+          <p:cNvPr id="6154" name="Picture 10" descr="C:\Users\brets\AppData\Local\Temp\SNAGHTML6e505e2.PNG"/>
           <p:cNvPicPr>
             <a:picLocks noGrp="1" noChangeAspect="1" noChangeArrowheads="1"/>
           </p:cNvPicPr>
@@ -22009,8 +22035,8 @@
         </p:blipFill>
         <p:spPr bwMode="auto">
           <a:xfrm>
-            <a:off x="930296" y="2734575"/>
-            <a:ext cx="10331408" cy="2533438"/>
+            <a:off x="394706" y="1498600"/>
+            <a:ext cx="8363473" cy="4678363"/>
           </a:xfrm>
           <a:prstGeom prst="rect">
             <a:avLst/>
@@ -22030,7 +22056,7 @@
     </p:spTree>
     <p:extLst>
       <p:ext uri="{BB962C8B-B14F-4D97-AF65-F5344CB8AC3E}">
-        <p14:creationId xmlns:p14="http://schemas.microsoft.com/office/powerpoint/2010/main" val="3181641661"/>
+        <p14:creationId xmlns:p14="http://schemas.microsoft.com/office/powerpoint/2010/main" val="1632508768"/>
       </p:ext>
     </p:extLst>
   </p:cSld>
@@ -22228,6 +22254,390 @@
           <a:p>
             <a:r>
               <a:rPr lang="en-US" dirty="0" smtClean="0"/>
+              <a:t>Reset health at game start</a:t>
+            </a:r>
+            <a:endParaRPr lang="en-US" dirty="0"/>
+          </a:p>
+        </p:txBody>
+      </p:sp>
+      <p:pic>
+        <p:nvPicPr>
+          <p:cNvPr id="7172" name="Picture 4" descr="C:\Users\brets\AppData\Local\Temp\SNAGHTML6e169ff.PNG"/>
+          <p:cNvPicPr>
+            <a:picLocks noGrp="1" noChangeAspect="1" noChangeArrowheads="1"/>
+          </p:cNvPicPr>
+          <p:nvPr>
+            <p:ph idx="1"/>
+          </p:nvPr>
+        </p:nvPicPr>
+        <p:blipFill>
+          <a:blip r:embed="rId2">
+            <a:extLst>
+              <a:ext uri="{28A0092B-C50C-407E-A947-70E740481C1C}">
+                <a14:useLocalDpi xmlns:a14="http://schemas.microsoft.com/office/drawing/2010/main" val="0"/>
+              </a:ext>
+            </a:extLst>
+          </a:blip>
+          <a:srcRect/>
+          <a:stretch>
+            <a:fillRect/>
+          </a:stretch>
+        </p:blipFill>
+        <p:spPr bwMode="auto">
+          <a:xfrm>
+            <a:off x="840790" y="2116667"/>
+            <a:ext cx="10510420" cy="3769254"/>
+          </a:xfrm>
+          <a:prstGeom prst="rect">
+            <a:avLst/>
+          </a:prstGeom>
+          <a:noFill/>
+          <a:extLst>
+            <a:ext uri="{909E8E84-426E-40DD-AFC4-6F175D3DCCD1}">
+              <a14:hiddenFill xmlns:a14="http://schemas.microsoft.com/office/drawing/2010/main">
+                <a:solidFill>
+                  <a:srgbClr val="FFFFFF"/>
+                </a:solidFill>
+              </a14:hiddenFill>
+            </a:ext>
+          </a:extLst>
+        </p:spPr>
+      </p:pic>
+    </p:spTree>
+    <p:extLst>
+      <p:ext uri="{BB962C8B-B14F-4D97-AF65-F5344CB8AC3E}">
+        <p14:creationId xmlns:p14="http://schemas.microsoft.com/office/powerpoint/2010/main" val="3720681087"/>
+      </p:ext>
+    </p:extLst>
+  </p:cSld>
+  <p:clrMapOvr>
+    <a:masterClrMapping/>
+  </p:clrMapOvr>
+</p:sld>
+</file>
+
+<file path=ppt/slides/slide31.xml><?xml version="1.0" encoding="utf-8"?>
+<p:sld xmlns:a="http://schemas.openxmlformats.org/drawingml/2006/main" xmlns:r="http://schemas.openxmlformats.org/officeDocument/2006/relationships" xmlns:p="http://schemas.openxmlformats.org/presentationml/2006/main">
+  <p:cSld>
+    <p:spTree>
+      <p:nvGrpSpPr>
+        <p:cNvPr id="1" name=""/>
+        <p:cNvGrpSpPr/>
+        <p:nvPr/>
+      </p:nvGrpSpPr>
+      <p:grpSpPr>
+        <a:xfrm>
+          <a:off x="0" y="0"/>
+          <a:ext cx="0" cy="0"/>
+          <a:chOff x="0" y="0"/>
+          <a:chExt cx="0" cy="0"/>
+        </a:xfrm>
+      </p:grpSpPr>
+      <p:sp>
+        <p:nvSpPr>
+          <p:cNvPr id="2" name="Title 1"/>
+          <p:cNvSpPr>
+            <a:spLocks noGrp="1"/>
+          </p:cNvSpPr>
+          <p:nvPr>
+            <p:ph type="title"/>
+          </p:nvPr>
+        </p:nvSpPr>
+        <p:spPr/>
+        <p:txBody>
+          <a:bodyPr/>
+          <a:lstStyle/>
+          <a:p>
+            <a:r>
+              <a:rPr lang="en-US" dirty="0" smtClean="0"/>
+              <a:t>Position the health bar</a:t>
+            </a:r>
+            <a:endParaRPr lang="en-US" dirty="0"/>
+          </a:p>
+        </p:txBody>
+      </p:sp>
+      <p:pic>
+        <p:nvPicPr>
+          <p:cNvPr id="9224" name="Picture 8" descr="C:\Users\brets\AppData\Local\Temp\SNAGHTML6dec116.PNG"/>
+          <p:cNvPicPr>
+            <a:picLocks noGrp="1" noChangeAspect="1" noChangeArrowheads="1"/>
+          </p:cNvPicPr>
+          <p:nvPr>
+            <p:ph idx="1"/>
+          </p:nvPr>
+        </p:nvPicPr>
+        <p:blipFill>
+          <a:blip r:embed="rId2">
+            <a:extLst>
+              <a:ext uri="{28A0092B-C50C-407E-A947-70E740481C1C}">
+                <a14:useLocalDpi xmlns:a14="http://schemas.microsoft.com/office/drawing/2010/main" val="0"/>
+              </a:ext>
+            </a:extLst>
+          </a:blip>
+          <a:srcRect/>
+          <a:stretch>
+            <a:fillRect/>
+          </a:stretch>
+        </p:blipFill>
+        <p:spPr bwMode="auto">
+          <a:xfrm>
+            <a:off x="3632199" y="1414603"/>
+            <a:ext cx="4927602" cy="5173382"/>
+          </a:xfrm>
+          <a:prstGeom prst="rect">
+            <a:avLst/>
+          </a:prstGeom>
+          <a:noFill/>
+          <a:extLst>
+            <a:ext uri="{909E8E84-426E-40DD-AFC4-6F175D3DCCD1}">
+              <a14:hiddenFill xmlns:a14="http://schemas.microsoft.com/office/drawing/2010/main">
+                <a:solidFill>
+                  <a:srgbClr val="FFFFFF"/>
+                </a:solidFill>
+              </a14:hiddenFill>
+            </a:ext>
+          </a:extLst>
+        </p:spPr>
+      </p:pic>
+    </p:spTree>
+    <p:extLst>
+      <p:ext uri="{BB962C8B-B14F-4D97-AF65-F5344CB8AC3E}">
+        <p14:creationId xmlns:p14="http://schemas.microsoft.com/office/powerpoint/2010/main" val="3828961237"/>
+      </p:ext>
+    </p:extLst>
+  </p:cSld>
+  <p:clrMapOvr>
+    <a:masterClrMapping/>
+  </p:clrMapOvr>
+</p:sld>
+</file>
+
+<file path=ppt/slides/slide32.xml><?xml version="1.0" encoding="utf-8"?>
+<p:sld xmlns:a="http://schemas.openxmlformats.org/drawingml/2006/main" xmlns:r="http://schemas.openxmlformats.org/officeDocument/2006/relationships" xmlns:p="http://schemas.openxmlformats.org/presentationml/2006/main">
+  <p:cSld>
+    <p:spTree>
+      <p:nvGrpSpPr>
+        <p:cNvPr id="1" name=""/>
+        <p:cNvGrpSpPr/>
+        <p:nvPr/>
+      </p:nvGrpSpPr>
+      <p:grpSpPr>
+        <a:xfrm>
+          <a:off x="0" y="0"/>
+          <a:ext cx="0" cy="0"/>
+          <a:chOff x="0" y="0"/>
+          <a:chExt cx="0" cy="0"/>
+        </a:xfrm>
+      </p:grpSpPr>
+      <p:sp>
+        <p:nvSpPr>
+          <p:cNvPr id="2" name="Title 1"/>
+          <p:cNvSpPr>
+            <a:spLocks noGrp="1"/>
+          </p:cNvSpPr>
+          <p:nvPr>
+            <p:ph type="title"/>
+          </p:nvPr>
+        </p:nvSpPr>
+        <p:spPr/>
+        <p:txBody>
+          <a:bodyPr/>
+          <a:lstStyle/>
+          <a:p>
+            <a:r>
+              <a:rPr lang="en-US" dirty="0" smtClean="0"/>
+              <a:t>Add game over logic to player</a:t>
+            </a:r>
+            <a:endParaRPr lang="en-US" dirty="0"/>
+          </a:p>
+        </p:txBody>
+      </p:sp>
+      <p:pic>
+        <p:nvPicPr>
+          <p:cNvPr id="8202" name="Picture 10" descr="C:\Users\brets\AppData\Local\Temp\SNAGHTML6e0d792.PNG"/>
+          <p:cNvPicPr>
+            <a:picLocks noGrp="1" noChangeAspect="1" noChangeArrowheads="1"/>
+          </p:cNvPicPr>
+          <p:nvPr>
+            <p:ph idx="1"/>
+          </p:nvPr>
+        </p:nvPicPr>
+        <p:blipFill>
+          <a:blip r:embed="rId2">
+            <a:extLst>
+              <a:ext uri="{28A0092B-C50C-407E-A947-70E740481C1C}">
+                <a14:useLocalDpi xmlns:a14="http://schemas.microsoft.com/office/drawing/2010/main" val="0"/>
+              </a:ext>
+            </a:extLst>
+          </a:blip>
+          <a:srcRect/>
+          <a:stretch>
+            <a:fillRect/>
+          </a:stretch>
+        </p:blipFill>
+        <p:spPr bwMode="auto">
+          <a:xfrm>
+            <a:off x="1588575" y="1825625"/>
+            <a:ext cx="9014850" cy="4351338"/>
+          </a:xfrm>
+          <a:prstGeom prst="rect">
+            <a:avLst/>
+          </a:prstGeom>
+          <a:noFill/>
+          <a:extLst>
+            <a:ext uri="{909E8E84-426E-40DD-AFC4-6F175D3DCCD1}">
+              <a14:hiddenFill xmlns:a14="http://schemas.microsoft.com/office/drawing/2010/main">
+                <a:solidFill>
+                  <a:srgbClr val="FFFFFF"/>
+                </a:solidFill>
+              </a14:hiddenFill>
+            </a:ext>
+          </a:extLst>
+        </p:spPr>
+      </p:pic>
+    </p:spTree>
+    <p:extLst>
+      <p:ext uri="{BB962C8B-B14F-4D97-AF65-F5344CB8AC3E}">
+        <p14:creationId xmlns:p14="http://schemas.microsoft.com/office/powerpoint/2010/main" val="2374615633"/>
+      </p:ext>
+    </p:extLst>
+  </p:cSld>
+  <p:clrMapOvr>
+    <a:masterClrMapping/>
+  </p:clrMapOvr>
+</p:sld>
+</file>
+
+<file path=ppt/slides/slide33.xml><?xml version="1.0" encoding="utf-8"?>
+<p:sld xmlns:a="http://schemas.openxmlformats.org/drawingml/2006/main" xmlns:r="http://schemas.openxmlformats.org/officeDocument/2006/relationships" xmlns:p="http://schemas.openxmlformats.org/presentationml/2006/main">
+  <p:cSld>
+    <p:spTree>
+      <p:nvGrpSpPr>
+        <p:cNvPr id="1" name=""/>
+        <p:cNvGrpSpPr/>
+        <p:nvPr/>
+      </p:nvGrpSpPr>
+      <p:grpSpPr>
+        <a:xfrm>
+          <a:off x="0" y="0"/>
+          <a:ext cx="0" cy="0"/>
+          <a:chOff x="0" y="0"/>
+          <a:chExt cx="0" cy="0"/>
+        </a:xfrm>
+      </p:grpSpPr>
+      <p:sp>
+        <p:nvSpPr>
+          <p:cNvPr id="2" name="Title 1"/>
+          <p:cNvSpPr>
+            <a:spLocks noGrp="1"/>
+          </p:cNvSpPr>
+          <p:nvPr>
+            <p:ph type="title"/>
+          </p:nvPr>
+        </p:nvSpPr>
+        <p:spPr/>
+        <p:txBody>
+          <a:bodyPr/>
+          <a:lstStyle/>
+          <a:p>
+            <a:r>
+              <a:rPr lang="en-US" dirty="0" smtClean="0"/>
+              <a:t>ADD ENEMY MOVEMENT</a:t>
+            </a:r>
+            <a:endParaRPr lang="en-US" dirty="0"/>
+          </a:p>
+        </p:txBody>
+      </p:sp>
+      <p:pic>
+        <p:nvPicPr>
+          <p:cNvPr id="20482" name="Picture 2" descr="C:\Users\brets\AppData\Local\Temp\SNAGHTML58ca9f1.PNG"/>
+          <p:cNvPicPr>
+            <a:picLocks noGrp="1" noChangeAspect="1" noChangeArrowheads="1"/>
+          </p:cNvPicPr>
+          <p:nvPr>
+            <p:ph idx="1"/>
+          </p:nvPr>
+        </p:nvPicPr>
+        <p:blipFill>
+          <a:blip r:embed="rId2">
+            <a:extLst>
+              <a:ext uri="{28A0092B-C50C-407E-A947-70E740481C1C}">
+                <a14:useLocalDpi xmlns:a14="http://schemas.microsoft.com/office/drawing/2010/main" val="0"/>
+              </a:ext>
+            </a:extLst>
+          </a:blip>
+          <a:srcRect/>
+          <a:stretch>
+            <a:fillRect/>
+          </a:stretch>
+        </p:blipFill>
+        <p:spPr bwMode="auto">
+          <a:xfrm>
+            <a:off x="930296" y="2734575"/>
+            <a:ext cx="10331408" cy="2533438"/>
+          </a:xfrm>
+          <a:prstGeom prst="rect">
+            <a:avLst/>
+          </a:prstGeom>
+          <a:noFill/>
+          <a:extLst>
+            <a:ext uri="{909E8E84-426E-40DD-AFC4-6F175D3DCCD1}">
+              <a14:hiddenFill xmlns:a14="http://schemas.microsoft.com/office/drawing/2010/main">
+                <a:solidFill>
+                  <a:srgbClr val="FFFFFF"/>
+                </a:solidFill>
+              </a14:hiddenFill>
+            </a:ext>
+          </a:extLst>
+        </p:spPr>
+      </p:pic>
+    </p:spTree>
+    <p:extLst>
+      <p:ext uri="{BB962C8B-B14F-4D97-AF65-F5344CB8AC3E}">
+        <p14:creationId xmlns:p14="http://schemas.microsoft.com/office/powerpoint/2010/main" val="3181641661"/>
+      </p:ext>
+    </p:extLst>
+  </p:cSld>
+  <p:clrMapOvr>
+    <a:masterClrMapping/>
+  </p:clrMapOvr>
+</p:sld>
+</file>
+
+<file path=ppt/slides/slide34.xml><?xml version="1.0" encoding="utf-8"?>
+<p:sld xmlns:a="http://schemas.openxmlformats.org/drawingml/2006/main" xmlns:r="http://schemas.openxmlformats.org/officeDocument/2006/relationships" xmlns:p="http://schemas.openxmlformats.org/presentationml/2006/main">
+  <p:cSld>
+    <p:spTree>
+      <p:nvGrpSpPr>
+        <p:cNvPr id="1" name=""/>
+        <p:cNvGrpSpPr/>
+        <p:nvPr/>
+      </p:nvGrpSpPr>
+      <p:grpSpPr>
+        <a:xfrm>
+          <a:off x="0" y="0"/>
+          <a:ext cx="0" cy="0"/>
+          <a:chOff x="0" y="0"/>
+          <a:chExt cx="0" cy="0"/>
+        </a:xfrm>
+      </p:grpSpPr>
+      <p:sp>
+        <p:nvSpPr>
+          <p:cNvPr id="2" name="Title 1"/>
+          <p:cNvSpPr>
+            <a:spLocks noGrp="1"/>
+          </p:cNvSpPr>
+          <p:nvPr>
+            <p:ph type="title"/>
+          </p:nvPr>
+        </p:nvSpPr>
+        <p:spPr/>
+        <p:txBody>
+          <a:bodyPr/>
+          <a:lstStyle/>
+          <a:p>
+            <a:r>
+              <a:rPr lang="en-US" dirty="0" smtClean="0"/>
               <a:t>ADD ENEMY FLIP BLOCK</a:t>
             </a:r>
             <a:endParaRPr lang="en-US" dirty="0"/>
@@ -22290,7 +22700,7 @@
 </p:sld>
 </file>
 
-<file path=ppt/slides/slide31.xml><?xml version="1.0" encoding="utf-8"?>
+<file path=ppt/slides/slide35.xml><?xml version="1.0" encoding="utf-8"?>
 <p:sld xmlns:a="http://schemas.openxmlformats.org/drawingml/2006/main" xmlns:r="http://schemas.openxmlformats.org/officeDocument/2006/relationships" xmlns:p="http://schemas.openxmlformats.org/presentationml/2006/main">
   <p:cSld>
     <p:spTree>
@@ -22386,7 +22796,7 @@
 </p:sld>
 </file>
 
-<file path=ppt/slides/slide32.xml><?xml version="1.0" encoding="utf-8"?>
+<file path=ppt/slides/slide36.xml><?xml version="1.0" encoding="utf-8"?>
 <p:sld xmlns:a="http://schemas.openxmlformats.org/drawingml/2006/main" xmlns:r="http://schemas.openxmlformats.org/officeDocument/2006/relationships" xmlns:p="http://schemas.openxmlformats.org/presentationml/2006/main">
   <p:cSld>
     <p:spTree>
@@ -22482,7 +22892,7 @@
 </p:sld>
 </file>
 
-<file path=ppt/slides/slide33.xml><?xml version="1.0" encoding="utf-8"?>
+<file path=ppt/slides/slide37.xml><?xml version="1.0" encoding="utf-8"?>
 <p:sld xmlns:a="http://schemas.openxmlformats.org/drawingml/2006/main" xmlns:r="http://schemas.openxmlformats.org/officeDocument/2006/relationships" xmlns:p="http://schemas.openxmlformats.org/presentationml/2006/main">
   <p:cSld>
     <p:spTree>

</xml_diff>